<commit_message>
B.Sc Computer Science Dissertation Project
</commit_message>
<xml_diff>
--- a/Algorithmic Trading Tutor.pptx
+++ b/Algorithmic Trading Tutor.pptx
@@ -275,7 +275,7 @@
           <a:p>
             <a:fld id="{DA49C8F2-8973-43F4-9753-5E5D77A27C30}" type="datetimeFigureOut">
               <a:rPr lang="en-GB" smtClean="0"/>
-              <a:t>26/03/2014</a:t>
+              <a:t>15/08/2016</a:t>
             </a:fld>
             <a:endParaRPr lang="en-GB" dirty="0"/>
           </a:p>
@@ -445,7 +445,7 @@
           <a:p>
             <a:fld id="{DA49C8F2-8973-43F4-9753-5E5D77A27C30}" type="datetimeFigureOut">
               <a:rPr lang="en-GB" smtClean="0"/>
-              <a:t>26/03/2014</a:t>
+              <a:t>15/08/2016</a:t>
             </a:fld>
             <a:endParaRPr lang="en-GB" dirty="0"/>
           </a:p>
@@ -625,7 +625,7 @@
           <a:p>
             <a:fld id="{DA49C8F2-8973-43F4-9753-5E5D77A27C30}" type="datetimeFigureOut">
               <a:rPr lang="en-GB" smtClean="0"/>
-              <a:t>26/03/2014</a:t>
+              <a:t>15/08/2016</a:t>
             </a:fld>
             <a:endParaRPr lang="en-GB" dirty="0"/>
           </a:p>
@@ -795,7 +795,7 @@
           <a:p>
             <a:fld id="{DA49C8F2-8973-43F4-9753-5E5D77A27C30}" type="datetimeFigureOut">
               <a:rPr lang="en-GB" smtClean="0"/>
-              <a:t>26/03/2014</a:t>
+              <a:t>15/08/2016</a:t>
             </a:fld>
             <a:endParaRPr lang="en-GB" dirty="0"/>
           </a:p>
@@ -1041,7 +1041,7 @@
           <a:p>
             <a:fld id="{DA49C8F2-8973-43F4-9753-5E5D77A27C30}" type="datetimeFigureOut">
               <a:rPr lang="en-GB" smtClean="0"/>
-              <a:t>26/03/2014</a:t>
+              <a:t>15/08/2016</a:t>
             </a:fld>
             <a:endParaRPr lang="en-GB" dirty="0"/>
           </a:p>
@@ -1273,7 +1273,7 @@
           <a:p>
             <a:fld id="{DA49C8F2-8973-43F4-9753-5E5D77A27C30}" type="datetimeFigureOut">
               <a:rPr lang="en-GB" smtClean="0"/>
-              <a:t>26/03/2014</a:t>
+              <a:t>15/08/2016</a:t>
             </a:fld>
             <a:endParaRPr lang="en-GB" dirty="0"/>
           </a:p>
@@ -1640,7 +1640,7 @@
           <a:p>
             <a:fld id="{DA49C8F2-8973-43F4-9753-5E5D77A27C30}" type="datetimeFigureOut">
               <a:rPr lang="en-GB" smtClean="0"/>
-              <a:t>26/03/2014</a:t>
+              <a:t>15/08/2016</a:t>
             </a:fld>
             <a:endParaRPr lang="en-GB" dirty="0"/>
           </a:p>
@@ -1758,7 +1758,7 @@
           <a:p>
             <a:fld id="{DA49C8F2-8973-43F4-9753-5E5D77A27C30}" type="datetimeFigureOut">
               <a:rPr lang="en-GB" smtClean="0"/>
-              <a:t>26/03/2014</a:t>
+              <a:t>15/08/2016</a:t>
             </a:fld>
             <a:endParaRPr lang="en-GB" dirty="0"/>
           </a:p>
@@ -1853,7 +1853,7 @@
           <a:p>
             <a:fld id="{DA49C8F2-8973-43F4-9753-5E5D77A27C30}" type="datetimeFigureOut">
               <a:rPr lang="en-GB" smtClean="0"/>
-              <a:t>26/03/2014</a:t>
+              <a:t>15/08/2016</a:t>
             </a:fld>
             <a:endParaRPr lang="en-GB" dirty="0"/>
           </a:p>
@@ -2130,7 +2130,7 @@
           <a:p>
             <a:fld id="{DA49C8F2-8973-43F4-9753-5E5D77A27C30}" type="datetimeFigureOut">
               <a:rPr lang="en-GB" smtClean="0"/>
-              <a:t>26/03/2014</a:t>
+              <a:t>15/08/2016</a:t>
             </a:fld>
             <a:endParaRPr lang="en-GB" dirty="0"/>
           </a:p>
@@ -2383,7 +2383,7 @@
           <a:p>
             <a:fld id="{DA49C8F2-8973-43F4-9753-5E5D77A27C30}" type="datetimeFigureOut">
               <a:rPr lang="en-GB" smtClean="0"/>
-              <a:t>26/03/2014</a:t>
+              <a:t>15/08/2016</a:t>
             </a:fld>
             <a:endParaRPr lang="en-GB" dirty="0"/>
           </a:p>
@@ -2596,7 +2596,7 @@
           <a:p>
             <a:fld id="{DA49C8F2-8973-43F4-9753-5E5D77A27C30}" type="datetimeFigureOut">
               <a:rPr lang="en-GB" smtClean="0"/>
-              <a:t>26/03/2014</a:t>
+              <a:t>15/08/2016</a:t>
             </a:fld>
             <a:endParaRPr lang="en-GB" dirty="0"/>
           </a:p>
@@ -3041,7 +3041,11 @@
           <a:p>
             <a:r>
               <a:rPr lang="en-GB" dirty="0" smtClean="0"/>
-              <a:t>James Michael Matthew Gallagher : 0800899g</a:t>
+              <a:t>James Michael Matthew </a:t>
+            </a:r>
+            <a:r>
+              <a:rPr lang="en-GB" dirty="0" smtClean="0"/>
+              <a:t>Gallagher</a:t>
             </a:r>
             <a:endParaRPr lang="en-GB" dirty="0"/>
           </a:p>

</xml_diff>